<commit_message>
updated Inception_Stage.pptx with future working plan notes
</commit_message>
<xml_diff>
--- a/Deliverbles/Inception/Inception_Stage.pptx
+++ b/Deliverbles/Inception/Inception_Stage.pptx
@@ -2868,7 +2868,7 @@
           <a:p>
             <a:fld id="{528CFCD3-A909-4B32-AED5-46A048D390D1}" type="datetimeFigureOut">
               <a:rPr lang="en-US" smtClean="0"/>
-              <a:t>1/27/2015</a:t>
+              <a:t>1/28/2015</a:t>
             </a:fld>
             <a:endParaRPr lang="en-US"/>
           </a:p>
@@ -3153,7 +3153,7 @@
           <a:p>
             <a:fld id="{528CFCD3-A909-4B32-AED5-46A048D390D1}" type="datetimeFigureOut">
               <a:rPr lang="en-US" smtClean="0"/>
-              <a:t>1/27/2015</a:t>
+              <a:t>1/28/2015</a:t>
             </a:fld>
             <a:endParaRPr lang="en-US"/>
           </a:p>
@@ -3328,7 +3328,7 @@
           <a:p>
             <a:fld id="{528CFCD3-A909-4B32-AED5-46A048D390D1}" type="datetimeFigureOut">
               <a:rPr lang="en-US" smtClean="0"/>
-              <a:t>1/27/2015</a:t>
+              <a:t>1/28/2015</a:t>
             </a:fld>
             <a:endParaRPr lang="en-US"/>
           </a:p>
@@ -3493,7 +3493,7 @@
           <a:p>
             <a:fld id="{528CFCD3-A909-4B32-AED5-46A048D390D1}" type="datetimeFigureOut">
               <a:rPr lang="en-US" smtClean="0"/>
-              <a:t>1/27/2015</a:t>
+              <a:t>1/28/2015</a:t>
             </a:fld>
             <a:endParaRPr lang="en-US"/>
           </a:p>
@@ -3734,7 +3734,7 @@
           <a:p>
             <a:fld id="{528CFCD3-A909-4B32-AED5-46A048D390D1}" type="datetimeFigureOut">
               <a:rPr lang="en-US" smtClean="0"/>
-              <a:t>1/27/2015</a:t>
+              <a:t>1/28/2015</a:t>
             </a:fld>
             <a:endParaRPr lang="en-US"/>
           </a:p>
@@ -3847,7 +3847,7 @@
           <a:p>
             <a:fld id="{528CFCD3-A909-4B32-AED5-46A048D390D1}" type="datetimeFigureOut">
               <a:rPr lang="en-US" smtClean="0"/>
-              <a:t>1/27/2015</a:t>
+              <a:t>1/28/2015</a:t>
             </a:fld>
             <a:endParaRPr lang="en-US"/>
           </a:p>
@@ -4386,7 +4386,7 @@
           <a:p>
             <a:fld id="{528CFCD3-A909-4B32-AED5-46A048D390D1}" type="datetimeFigureOut">
               <a:rPr lang="en-US" smtClean="0"/>
-              <a:t>1/27/2015</a:t>
+              <a:t>1/28/2015</a:t>
             </a:fld>
             <a:endParaRPr lang="en-US"/>
           </a:p>
@@ -4499,7 +4499,7 @@
           <a:p>
             <a:fld id="{528CFCD3-A909-4B32-AED5-46A048D390D1}" type="datetimeFigureOut">
               <a:rPr lang="en-US" smtClean="0"/>
-              <a:t>1/27/2015</a:t>
+              <a:t>1/28/2015</a:t>
             </a:fld>
             <a:endParaRPr lang="en-US"/>
           </a:p>
@@ -4589,7 +4589,7 @@
           <a:p>
             <a:fld id="{528CFCD3-A909-4B32-AED5-46A048D390D1}" type="datetimeFigureOut">
               <a:rPr lang="en-US" smtClean="0"/>
-              <a:t>1/27/2015</a:t>
+              <a:t>1/28/2015</a:t>
             </a:fld>
             <a:endParaRPr lang="en-US"/>
           </a:p>
@@ -7240,7 +7240,7 @@
           <a:p>
             <a:fld id="{528CFCD3-A909-4B32-AED5-46A048D390D1}" type="datetimeFigureOut">
               <a:rPr lang="en-US" smtClean="0"/>
-              <a:t>1/27/2015</a:t>
+              <a:t>1/28/2015</a:t>
             </a:fld>
             <a:endParaRPr lang="en-US"/>
           </a:p>
@@ -10452,7 +10452,7 @@
           <a:p>
             <a:fld id="{528CFCD3-A909-4B32-AED5-46A048D390D1}" type="datetimeFigureOut">
               <a:rPr lang="en-US" smtClean="0"/>
-              <a:t>1/27/2015</a:t>
+              <a:t>1/28/2015</a:t>
             </a:fld>
             <a:endParaRPr lang="en-US"/>
           </a:p>
@@ -13274,7 +13274,7 @@
           <a:p>
             <a:fld id="{528CFCD3-A909-4B32-AED5-46A048D390D1}" type="datetimeFigureOut">
               <a:rPr lang="en-US" smtClean="0"/>
-              <a:t>1/27/2015</a:t>
+              <a:t>1/28/2015</a:t>
             </a:fld>
             <a:endParaRPr lang="en-US"/>
           </a:p>
@@ -14522,9 +14522,16 @@
             <p:ph type="title"/>
           </p:nvPr>
         </p:nvSpPr>
-        <p:spPr/>
+        <p:spPr>
+          <a:xfrm>
+            <a:off x="1043490" y="762000"/>
+            <a:ext cx="7024744" cy="762000"/>
+          </a:xfrm>
+        </p:spPr>
         <p:txBody>
-          <a:bodyPr/>
+          <a:bodyPr>
+            <a:normAutofit/>
+          </a:bodyPr>
           <a:lstStyle/>
           <a:p>
             <a:r>
@@ -14544,54 +14551,112 @@
             <p:ph idx="1"/>
           </p:nvPr>
         </p:nvSpPr>
-        <p:spPr/>
+        <p:spPr>
+          <a:xfrm>
+            <a:off x="533400" y="1752600"/>
+            <a:ext cx="8100508" cy="4724400"/>
+          </a:xfrm>
+        </p:spPr>
         <p:txBody>
           <a:bodyPr>
-            <a:normAutofit fontScale="92500"/>
+            <a:normAutofit lnSpcReduction="10000"/>
           </a:bodyPr>
           <a:lstStyle/>
           <a:p>
-            <a:pPr lvl="0"/>
             <a:r>
               <a:rPr lang="en-US" dirty="0"/>
-              <a:t>Formulate design for UI and database</a:t>
+              <a:t>  High Level: Formulate design for UI and database </a:t>
+            </a:r>
+          </a:p>
+          <a:p>
+            <a:pPr lvl="1"/>
+            <a:r>
+              <a:rPr lang="en-US" sz="1800" dirty="0"/>
+              <a:t>  Web based user interface – implementation details?</a:t>
+            </a:r>
+          </a:p>
+          <a:p>
+            <a:pPr lvl="1"/>
+            <a:r>
+              <a:rPr lang="en-US" sz="1800" dirty="0"/>
+              <a:t>  </a:t>
+            </a:r>
+            <a:r>
+              <a:rPr lang="en-US" sz="1900" dirty="0"/>
+              <a:t>Database type and schema design</a:t>
             </a:r>
           </a:p>
           <a:p>
             <a:r>
               <a:rPr lang="en-US" dirty="0"/>
-              <a:t>Draft application demo for first two use cases</a:t>
+              <a:t>  Detailed Level: Draft demo for fully dressed use cases</a:t>
             </a:r>
           </a:p>
           <a:p>
             <a:pPr lvl="1"/>
             <a:r>
-              <a:rPr lang="en-US" dirty="0"/>
-              <a:t>Search for grocery item</a:t>
+              <a:rPr lang="en-US" sz="1800" dirty="0"/>
+              <a:t>  Search for grocery item</a:t>
             </a:r>
           </a:p>
           <a:p>
             <a:pPr lvl="1"/>
             <a:r>
-              <a:rPr lang="en-US" dirty="0"/>
-              <a:t>Add grocery item – will we need to create authentication piece for this as well?</a:t>
+              <a:rPr lang="en-US" sz="1800" dirty="0"/>
+              <a:t>  Add grocery item </a:t>
             </a:r>
           </a:p>
           <a:p>
             <a:pPr lvl="1"/>
             <a:r>
+              <a:rPr lang="en-US" sz="1800" dirty="0"/>
+              <a:t>  Manage </a:t>
+            </a:r>
+            <a:r>
+              <a:rPr lang="en-US" sz="1900" dirty="0"/>
+              <a:t>grocery items</a:t>
+            </a:r>
+            <a:r>
               <a:rPr lang="en-US" dirty="0"/>
-              <a:t>Manage grocery items</a:t>
+              <a:t> </a:t>
+            </a:r>
+            <a:endParaRPr lang="en-US" dirty="0" smtClean="0"/>
+          </a:p>
+          <a:p>
+            <a:r>
+              <a:rPr lang="en-US" dirty="0" smtClean="0"/>
+              <a:t></a:t>
+            </a:r>
+            <a:r>
+              <a:rPr lang="en-US" dirty="0"/>
+              <a:t>  Issues to complete vs to deferred to the next iteration</a:t>
             </a:r>
           </a:p>
           <a:p>
+            <a:pPr lvl="1"/>
             <a:r>
-              <a:rPr lang="en-US"/>
-              <a:t>All issues for the current iteration must be marked as complete or deferred to the next iteration</a:t>
+              <a:rPr lang="en-US" sz="1800" dirty="0"/>
+              <a:t>  Searching with predictive text?</a:t>
             </a:r>
           </a:p>
           <a:p>
-            <a:endParaRPr lang="en-US" dirty="0"/>
+            <a:pPr lvl="1"/>
+            <a:r>
+              <a:rPr lang="en-US" sz="1800" dirty="0"/>
+              <a:t>  Will we need to create authentication piece for the ‘add grocery item’ use case?</a:t>
+            </a:r>
+          </a:p>
+          <a:p>
+            <a:pPr lvl="1"/>
+            <a:r>
+              <a:rPr lang="en-US" sz="1800" dirty="0"/>
+              <a:t>  </a:t>
+            </a:r>
+            <a:r>
+              <a:rPr lang="en-US" sz="1900" dirty="0"/>
+              <a:t>Do we start with anything populated in our database? </a:t>
+            </a:r>
+            <a:endParaRPr lang="en-US" sz="1900" dirty="0"/>
           </a:p>
         </p:txBody>
       </p:sp>

</xml_diff>

<commit_message>
Role update on the first Inception slide
</commit_message>
<xml_diff>
--- a/Deliverbles/Inception/Inception_Stage.pptx
+++ b/Deliverbles/Inception/Inception_Stage.pptx
@@ -13815,9 +13815,18 @@
           <a:p>
             <a:pPr lvl="1" algn="l"/>
             <a:r>
+              <a:rPr lang="en-US" dirty="0"/>
+              <a:t>(</a:t>
+            </a:r>
+            <a:r>
+              <a:rPr lang="en-US" dirty="0" err="1" smtClean="0"/>
+              <a:t>Implementor</a:t>
+            </a:r>
+            <a:r>
               <a:rPr lang="en-US" dirty="0" smtClean="0"/>
-              <a:t>(Role)</a:t>
+              <a:t>)</a:t>
             </a:r>
+            <a:endParaRPr lang="en-US" dirty="0" smtClean="0"/>
           </a:p>
           <a:p>
             <a:pPr lvl="1" algn="l"/>
@@ -13834,12 +13843,8 @@
           <a:p>
             <a:pPr lvl="1" algn="l"/>
             <a:r>
-              <a:rPr lang="en-US" dirty="0"/>
-              <a:t>(Role</a:t>
-            </a:r>
-            <a:r>
               <a:rPr lang="en-US" dirty="0" smtClean="0"/>
-              <a:t>)</a:t>
+              <a:t>(Configuration Manager)</a:t>
             </a:r>
             <a:endParaRPr lang="en-US" dirty="0"/>
           </a:p>
@@ -13865,13 +13870,10 @@
           <a:p>
             <a:pPr lvl="1" algn="l"/>
             <a:r>
-              <a:rPr lang="en-US" dirty="0"/>
-              <a:t>(Role</a:t>
+              <a:rPr lang="en-US" dirty="0" smtClean="0"/>
+              <a:t>(Tester)</a:t>
             </a:r>
-            <a:r>
-              <a:rPr lang="en-US" dirty="0" smtClean="0"/>
-              <a:t>)</a:t>
-            </a:r>
+            <a:endParaRPr lang="en-US" dirty="0" smtClean="0"/>
           </a:p>
           <a:p>
             <a:pPr lvl="1" algn="l"/>
@@ -13884,8 +13886,9 @@
             <a:pPr lvl="1" algn="l"/>
             <a:r>
               <a:rPr lang="en-US" dirty="0"/>
-              <a:t>(Role)</a:t>
+              <a:t>(Team Leader)</a:t>
             </a:r>
+            <a:endParaRPr lang="en-US" dirty="0"/>
           </a:p>
           <a:p>
             <a:pPr lvl="1" algn="l"/>
@@ -14656,7 +14659,6 @@
               <a:rPr lang="en-US" sz="1900" dirty="0"/>
               <a:t>Do we start with anything populated in our database? </a:t>
             </a:r>
-            <a:endParaRPr lang="en-US" sz="1900" dirty="0"/>
           </a:p>
         </p:txBody>
       </p:sp>

</xml_diff>

<commit_message>
Updated Use cases Slide
</commit_message>
<xml_diff>
--- a/Deliverbles/Inception/Inception_Stage.pptx
+++ b/Deliverbles/Inception/Inception_Stage.pptx
@@ -13826,7 +13826,6 @@
               <a:rPr lang="en-US" dirty="0" smtClean="0"/>
               <a:t>)</a:t>
             </a:r>
-            <a:endParaRPr lang="en-US" dirty="0" smtClean="0"/>
           </a:p>
           <a:p>
             <a:pPr lvl="1" algn="l"/>
@@ -13873,7 +13872,6 @@
               <a:rPr lang="en-US" dirty="0" smtClean="0"/>
               <a:t>(Tester)</a:t>
             </a:r>
-            <a:endParaRPr lang="en-US" dirty="0" smtClean="0"/>
           </a:p>
           <a:p>
             <a:pPr lvl="1" algn="l"/>
@@ -13888,7 +13886,6 @@
               <a:rPr lang="en-US" dirty="0"/>
               <a:t>(Team Leader)</a:t>
             </a:r>
-            <a:endParaRPr lang="en-US" dirty="0"/>
           </a:p>
           <a:p>
             <a:pPr lvl="1" algn="l"/>
@@ -14313,14 +14310,18 @@
           <a:lstStyle/>
           <a:p>
             <a:r>
-              <a:rPr lang="en-US" dirty="0"/>
-              <a:t>project aim and </a:t>
+              <a:rPr lang="en-US" b="1" dirty="0" smtClean="0"/>
+              <a:t>Project Aim </a:t>
             </a:r>
             <a:r>
-              <a:rPr lang="en-US" dirty="0" smtClean="0"/>
-              <a:t>goal</a:t>
+              <a:rPr lang="en-US" b="1" dirty="0"/>
+              <a:t>and </a:t>
             </a:r>
-            <a:endParaRPr lang="en-US" dirty="0"/>
+            <a:r>
+              <a:rPr lang="en-US" b="1" dirty="0" smtClean="0"/>
+              <a:t>Goal</a:t>
+            </a:r>
+            <a:endParaRPr lang="en-US" b="1" dirty="0"/>
           </a:p>
         </p:txBody>
       </p:sp>
@@ -14389,9 +14390,22 @@
           <a:lstStyle/>
           <a:p>
             <a:r>
-              <a:rPr lang="en-US" dirty="0"/>
-              <a:t>requirement analysis</a:t>
+              <a:rPr lang="en-US" b="1" dirty="0"/>
+              <a:t>R</a:t>
             </a:r>
+            <a:r>
+              <a:rPr lang="en-US" b="1" dirty="0" smtClean="0"/>
+              <a:t>equirement </a:t>
+            </a:r>
+            <a:r>
+              <a:rPr lang="en-US" b="1" dirty="0"/>
+              <a:t>A</a:t>
+            </a:r>
+            <a:r>
+              <a:rPr lang="en-US" b="1" dirty="0" smtClean="0"/>
+              <a:t>nalysis</a:t>
+            </a:r>
+            <a:endParaRPr lang="en-US" b="1" dirty="0"/>
           </a:p>
         </p:txBody>
       </p:sp>
@@ -14454,15 +14468,37 @@
             <p:ph type="title"/>
           </p:nvPr>
         </p:nvSpPr>
-        <p:spPr/>
+        <p:spPr>
+          <a:xfrm>
+            <a:off x="1043490" y="1027664"/>
+            <a:ext cx="7024744" cy="801136"/>
+          </a:xfrm>
+        </p:spPr>
         <p:txBody>
           <a:bodyPr/>
           <a:lstStyle/>
           <a:p>
             <a:r>
-              <a:rPr lang="en-US" dirty="0"/>
-              <a:t>summary of use cases</a:t>
+              <a:rPr lang="en-US" b="1" dirty="0" smtClean="0"/>
+              <a:t>Summary </a:t>
             </a:r>
+            <a:r>
+              <a:rPr lang="en-US" b="1" dirty="0"/>
+              <a:t>of </a:t>
+            </a:r>
+            <a:r>
+              <a:rPr lang="en-US" b="1" dirty="0" smtClean="0"/>
+              <a:t>Use </a:t>
+            </a:r>
+            <a:r>
+              <a:rPr lang="en-US" b="1" dirty="0"/>
+              <a:t>C</a:t>
+            </a:r>
+            <a:r>
+              <a:rPr lang="en-US" b="1" dirty="0" smtClean="0"/>
+              <a:t>ases</a:t>
+            </a:r>
+            <a:endParaRPr lang="en-US" b="1" dirty="0"/>
           </a:p>
         </p:txBody>
       </p:sp>
@@ -14476,12 +14512,87 @@
             <p:ph idx="1"/>
           </p:nvPr>
         </p:nvSpPr>
-        <p:spPr/>
+        <p:spPr>
+          <a:xfrm>
+            <a:off x="990600" y="1981200"/>
+            <a:ext cx="7543800" cy="4419600"/>
+          </a:xfrm>
+        </p:spPr>
         <p:txBody>
-          <a:bodyPr/>
+          <a:bodyPr>
+            <a:normAutofit/>
+          </a:bodyPr>
           <a:lstStyle/>
           <a:p>
-            <a:endParaRPr lang="en-US"/>
+            <a:r>
+              <a:rPr lang="en-US" dirty="0" smtClean="0"/>
+              <a:t>1. Search </a:t>
+            </a:r>
+            <a:r>
+              <a:rPr lang="en-US" dirty="0"/>
+              <a:t>for an item</a:t>
+            </a:r>
+          </a:p>
+          <a:p>
+            <a:r>
+              <a:rPr lang="en-US" dirty="0"/>
+              <a:t>2. Sort Items by distance or price</a:t>
+            </a:r>
+          </a:p>
+          <a:p>
+            <a:r>
+              <a:rPr lang="en-US" dirty="0"/>
+              <a:t>3. Login/ Register (option </a:t>
+            </a:r>
+            <a:r>
+              <a:rPr lang="en-US" dirty="0" smtClean="0"/>
+              <a:t>to</a:t>
+            </a:r>
+            <a:r>
+              <a:rPr lang="en-US" dirty="0"/>
+              <a:t> use Gmail/</a:t>
+            </a:r>
+            <a:r>
+              <a:rPr lang="en-US" dirty="0" err="1"/>
+              <a:t>facebook</a:t>
+            </a:r>
+            <a:r>
+              <a:rPr lang="en-US" dirty="0"/>
+              <a:t> login)</a:t>
+            </a:r>
+          </a:p>
+          <a:p>
+            <a:r>
+              <a:rPr lang="en-US" dirty="0"/>
+              <a:t>4. Add an item (name, price, and picture)</a:t>
+            </a:r>
+          </a:p>
+          <a:p>
+            <a:r>
+              <a:rPr lang="en-US" dirty="0"/>
+              <a:t>5. Update item (price, name or image)</a:t>
+            </a:r>
+          </a:p>
+          <a:p>
+            <a:r>
+              <a:rPr lang="en-US" dirty="0"/>
+              <a:t>6. Delete item</a:t>
+            </a:r>
+          </a:p>
+          <a:p>
+            <a:r>
+              <a:rPr lang="en-US" dirty="0"/>
+              <a:t>7. Update profile (By user or admin)</a:t>
+            </a:r>
+          </a:p>
+          <a:p>
+            <a:r>
+              <a:rPr lang="en-US" dirty="0"/>
+              <a:t>8. Delete profile (By user or admin)</a:t>
+            </a:r>
+          </a:p>
+          <a:p>
+            <a:endParaRPr lang="en-US" dirty="0"/>
           </a:p>
         </p:txBody>
       </p:sp>
@@ -14538,9 +14649,26 @@
           <a:lstStyle/>
           <a:p>
             <a:r>
-              <a:rPr lang="en-US" dirty="0"/>
-              <a:t>future working plan</a:t>
+              <a:rPr lang="en-US" b="1" dirty="0" smtClean="0"/>
+              <a:t>Future </a:t>
             </a:r>
+            <a:r>
+              <a:rPr lang="en-US" b="1" dirty="0"/>
+              <a:t>W</a:t>
+            </a:r>
+            <a:r>
+              <a:rPr lang="en-US" b="1" dirty="0" smtClean="0"/>
+              <a:t>orking </a:t>
+            </a:r>
+            <a:r>
+              <a:rPr lang="en-US" b="1" dirty="0"/>
+              <a:t>P</a:t>
+            </a:r>
+            <a:r>
+              <a:rPr lang="en-US" b="1" dirty="0" smtClean="0"/>
+              <a:t>lan</a:t>
+            </a:r>
+            <a:endParaRPr lang="en-US" b="1" dirty="0"/>
           </a:p>
         </p:txBody>
       </p:sp>

</xml_diff>

<commit_message>
Add information to presentation PowerPoint.
</commit_message>
<xml_diff>
--- a/Deliverbles/Inception/Inception_Stage.pptx
+++ b/Deliverbles/Inception/Inception_Stage.pptx
@@ -7,9 +7,10 @@
   <p:sldIdLst>
     <p:sldId id="256" r:id="rId2"/>
     <p:sldId id="257" r:id="rId3"/>
-    <p:sldId id="258" r:id="rId4"/>
-    <p:sldId id="259" r:id="rId5"/>
-    <p:sldId id="260" r:id="rId6"/>
+    <p:sldId id="261" r:id="rId4"/>
+    <p:sldId id="258" r:id="rId5"/>
+    <p:sldId id="259" r:id="rId6"/>
+    <p:sldId id="260" r:id="rId7"/>
   </p:sldIdLst>
   <p:sldSz cx="9144000" cy="6858000" type="screen4x3"/>
   <p:notesSz cx="6858000" cy="9144000"/>
@@ -2868,7 +2869,7 @@
           <a:p>
             <a:fld id="{528CFCD3-A909-4B32-AED5-46A048D390D1}" type="datetimeFigureOut">
               <a:rPr lang="en-US" smtClean="0"/>
-              <a:t>1/28/2015</a:t>
+              <a:t>1/28/15</a:t>
             </a:fld>
             <a:endParaRPr lang="en-US"/>
           </a:p>
@@ -3153,7 +3154,7 @@
           <a:p>
             <a:fld id="{528CFCD3-A909-4B32-AED5-46A048D390D1}" type="datetimeFigureOut">
               <a:rPr lang="en-US" smtClean="0"/>
-              <a:t>1/28/2015</a:t>
+              <a:t>1/28/15</a:t>
             </a:fld>
             <a:endParaRPr lang="en-US"/>
           </a:p>
@@ -3328,7 +3329,7 @@
           <a:p>
             <a:fld id="{528CFCD3-A909-4B32-AED5-46A048D390D1}" type="datetimeFigureOut">
               <a:rPr lang="en-US" smtClean="0"/>
-              <a:t>1/28/2015</a:t>
+              <a:t>1/28/15</a:t>
             </a:fld>
             <a:endParaRPr lang="en-US"/>
           </a:p>
@@ -3493,7 +3494,7 @@
           <a:p>
             <a:fld id="{528CFCD3-A909-4B32-AED5-46A048D390D1}" type="datetimeFigureOut">
               <a:rPr lang="en-US" smtClean="0"/>
-              <a:t>1/28/2015</a:t>
+              <a:t>1/28/15</a:t>
             </a:fld>
             <a:endParaRPr lang="en-US"/>
           </a:p>
@@ -3734,7 +3735,7 @@
           <a:p>
             <a:fld id="{528CFCD3-A909-4B32-AED5-46A048D390D1}" type="datetimeFigureOut">
               <a:rPr lang="en-US" smtClean="0"/>
-              <a:t>1/28/2015</a:t>
+              <a:t>1/28/15</a:t>
             </a:fld>
             <a:endParaRPr lang="en-US"/>
           </a:p>
@@ -3847,7 +3848,7 @@
           <a:p>
             <a:fld id="{528CFCD3-A909-4B32-AED5-46A048D390D1}" type="datetimeFigureOut">
               <a:rPr lang="en-US" smtClean="0"/>
-              <a:t>1/28/2015</a:t>
+              <a:t>1/28/15</a:t>
             </a:fld>
             <a:endParaRPr lang="en-US"/>
           </a:p>
@@ -4386,7 +4387,7 @@
           <a:p>
             <a:fld id="{528CFCD3-A909-4B32-AED5-46A048D390D1}" type="datetimeFigureOut">
               <a:rPr lang="en-US" smtClean="0"/>
-              <a:t>1/28/2015</a:t>
+              <a:t>1/28/15</a:t>
             </a:fld>
             <a:endParaRPr lang="en-US"/>
           </a:p>
@@ -4499,7 +4500,7 @@
           <a:p>
             <a:fld id="{528CFCD3-A909-4B32-AED5-46A048D390D1}" type="datetimeFigureOut">
               <a:rPr lang="en-US" smtClean="0"/>
-              <a:t>1/28/2015</a:t>
+              <a:t>1/28/15</a:t>
             </a:fld>
             <a:endParaRPr lang="en-US"/>
           </a:p>
@@ -4589,7 +4590,7 @@
           <a:p>
             <a:fld id="{528CFCD3-A909-4B32-AED5-46A048D390D1}" type="datetimeFigureOut">
               <a:rPr lang="en-US" smtClean="0"/>
-              <a:t>1/28/2015</a:t>
+              <a:t>1/28/15</a:t>
             </a:fld>
             <a:endParaRPr lang="en-US"/>
           </a:p>
@@ -7240,7 +7241,7 @@
           <a:p>
             <a:fld id="{528CFCD3-A909-4B32-AED5-46A048D390D1}" type="datetimeFigureOut">
               <a:rPr lang="en-US" smtClean="0"/>
-              <a:t>1/28/2015</a:t>
+              <a:t>1/28/15</a:t>
             </a:fld>
             <a:endParaRPr lang="en-US"/>
           </a:p>
@@ -10452,7 +10453,7 @@
           <a:p>
             <a:fld id="{528CFCD3-A909-4B32-AED5-46A048D390D1}" type="datetimeFigureOut">
               <a:rPr lang="en-US" smtClean="0"/>
-              <a:t>1/28/2015</a:t>
+              <a:t>1/28/15</a:t>
             </a:fld>
             <a:endParaRPr lang="en-US"/>
           </a:p>
@@ -13274,7 +13275,7 @@
           <a:p>
             <a:fld id="{528CFCD3-A909-4B32-AED5-46A048D390D1}" type="datetimeFigureOut">
               <a:rPr lang="en-US" smtClean="0"/>
-              <a:t>1/28/2015</a:t>
+              <a:t>1/28/15</a:t>
             </a:fld>
             <a:endParaRPr lang="en-US"/>
           </a:p>
@@ -13924,7 +13925,7 @@
           </a:prstGeom>
           <a:noFill/>
           <a:extLst>
-            <a:ext uri="{909E8E84-426E-40DD-AFC4-6F175D3DCCD1}">
+            <a:ext uri="{909E8E84-426E-40dd-AFC4-6F175D3DCCD1}">
               <a14:hiddenFill xmlns:a14="http://schemas.microsoft.com/office/drawing/2010/main">
                 <a:solidFill>
                   <a:srgbClr val="FFFFFF"/>
@@ -14337,8 +14338,16 @@
         </p:nvSpPr>
         <p:spPr/>
         <p:txBody>
-          <a:bodyPr/>
+          <a:bodyPr>
+            <a:normAutofit fontScale="92500"/>
+          </a:bodyPr>
           <a:lstStyle/>
+          <a:p>
+            <a:r>
+              <a:rPr lang="en-US"/>
+              <a:t>Grocery pricing currently varies wildly based on variables such as supply, demand, and the availability of substitute items. We envision a web application that will allow an end user to compare the price of a grocery item based on geographic location. Other features include the ability to crowdsource grocery prices, and add and remove grocery items from a geographic region based on availability.</a:t>
+            </a:r>
+          </a:p>
           <a:p>
             <a:endParaRPr lang="en-US"/>
           </a:p>
@@ -14390,20 +14399,16 @@
           <a:lstStyle/>
           <a:p>
             <a:r>
+              <a:rPr lang="en-US" b="1" dirty="0" smtClean="0"/>
+              <a:t>Project Aim </a:t>
+            </a:r>
+            <a:r>
               <a:rPr lang="en-US" b="1" dirty="0"/>
-              <a:t>R</a:t>
+              <a:t>and </a:t>
             </a:r>
             <a:r>
               <a:rPr lang="en-US" b="1" dirty="0" smtClean="0"/>
-              <a:t>equirement </a:t>
-            </a:r>
-            <a:r>
-              <a:rPr lang="en-US" b="1" dirty="0"/>
-              <a:t>A</a:t>
-            </a:r>
-            <a:r>
-              <a:rPr lang="en-US" b="1" dirty="0" smtClean="0"/>
-              <a:t>nalysis</a:t>
+              <a:t>Goal</a:t>
             </a:r>
             <a:endParaRPr lang="en-US" b="1" dirty="0"/>
           </a:p>
@@ -14421,9 +14426,20 @@
         </p:nvSpPr>
         <p:spPr/>
         <p:txBody>
-          <a:bodyPr/>
+          <a:bodyPr>
+            <a:normAutofit/>
+          </a:bodyPr>
           <a:lstStyle/>
           <a:p>
+            <a:r>
+              <a:rPr lang="en-US"/>
+              <a:t>There is currently no way for a grocery consumer to compare prices within a geographic region. This application will fill that void with a reliable geographically-based comparison engine and crowdsourcing features.</a:t>
+            </a:r>
+          </a:p>
+          <a:p>
+            <a:pPr marL="68580" indent="0">
+              <a:buNone/>
+            </a:pPr>
             <a:endParaRPr lang="en-US"/>
           </a:p>
         </p:txBody>
@@ -14431,7 +14447,7 @@
     </p:spTree>
     <p:extLst>
       <p:ext uri="{BB962C8B-B14F-4D97-AF65-F5344CB8AC3E}">
-        <p14:creationId xmlns:p14="http://schemas.microsoft.com/office/powerpoint/2010/main" val="306607062"/>
+        <p14:creationId xmlns:p14="http://schemas.microsoft.com/office/powerpoint/2010/main" val="2371507751"/>
       </p:ext>
     </p:extLst>
   </p:cSld>
@@ -14470,8 +14486,8 @@
         </p:nvSpPr>
         <p:spPr>
           <a:xfrm>
-            <a:off x="1043490" y="1027664"/>
-            <a:ext cx="7024744" cy="801136"/>
+            <a:off x="990600" y="1066800"/>
+            <a:ext cx="7024744" cy="1143000"/>
           </a:xfrm>
         </p:spPr>
         <p:txBody>
@@ -14479,24 +14495,20 @@
           <a:lstStyle/>
           <a:p>
             <a:r>
+              <a:rPr lang="en-US" b="1" dirty="0"/>
+              <a:t>R</a:t>
+            </a:r>
+            <a:r>
               <a:rPr lang="en-US" b="1" dirty="0" smtClean="0"/>
-              <a:t>Summary </a:t>
+              <a:t>equirement </a:t>
             </a:r>
             <a:r>
               <a:rPr lang="en-US" b="1" dirty="0"/>
-              <a:t>of </a:t>
+              <a:t>A</a:t>
             </a:r>
             <a:r>
               <a:rPr lang="en-US" b="1" dirty="0" smtClean="0"/>
-              <a:t>Use </a:t>
-            </a:r>
-            <a:r>
-              <a:rPr lang="en-US" b="1" dirty="0"/>
-              <a:t>C</a:t>
-            </a:r>
-            <a:r>
-              <a:rPr lang="en-US" b="1" dirty="0" smtClean="0"/>
-              <a:t>ases</a:t>
+              <a:t>nalysis</a:t>
             </a:r>
             <a:endParaRPr lang="en-US" b="1" dirty="0"/>
           </a:p>
@@ -14512,102 +14524,46 @@
             <p:ph idx="1"/>
           </p:nvPr>
         </p:nvSpPr>
-        <p:spPr>
-          <a:xfrm>
-            <a:off x="990600" y="1981200"/>
-            <a:ext cx="7543800" cy="4419600"/>
-          </a:xfrm>
-        </p:spPr>
+        <p:spPr/>
         <p:txBody>
-          <a:bodyPr>
-            <a:normAutofit/>
-          </a:bodyPr>
+          <a:bodyPr/>
           <a:lstStyle/>
           <a:p>
             <a:r>
-              <a:rPr lang="en-US" dirty="0" smtClean="0"/>
-              <a:t>1. Search </a:t>
+              <a:rPr lang="en-US"/>
+              <a:t>Grocery items categorized by geographical area</a:t>
             </a:r>
+          </a:p>
+          <a:p>
             <a:r>
-              <a:rPr lang="en-US" dirty="0"/>
-              <a:t>for an item</a:t>
+              <a:rPr lang="en-US"/>
+              <a:t>Ability for users to add/remove/modify grocery items within geographical area</a:t>
             </a:r>
           </a:p>
           <a:p>
             <a:r>
-              <a:rPr lang="en-US" dirty="0"/>
-              <a:t>2. Sort Items by distance or price</a:t>
+              <a:rPr lang="en-US"/>
+              <a:t>Ability for users to easily query grocery item data</a:t>
             </a:r>
           </a:p>
           <a:p>
             <a:r>
-              <a:rPr lang="en-US" dirty="0"/>
-              <a:t>3. Login/ Register (option </a:t>
+              <a:rPr lang="en-US"/>
+              <a:t>Account system and administration system for community management</a:t>
             </a:r>
-            <a:r>
-              <a:rPr lang="en-US" dirty="0" smtClean="0"/>
-              <a:t>to</a:t>
-            </a:r>
-            <a:r>
-              <a:rPr lang="en-US" dirty="0"/>
-              <a:t> use </a:t>
-            </a:r>
-            <a:r>
-              <a:rPr lang="en-US" dirty="0" smtClean="0"/>
-              <a:t>Gmail/</a:t>
-            </a:r>
-            <a:r>
-              <a:rPr lang="en-US" dirty="0"/>
-              <a:t>F</a:t>
-            </a:r>
-            <a:r>
-              <a:rPr lang="en-US" dirty="0" smtClean="0"/>
-              <a:t>acebook </a:t>
-            </a:r>
-            <a:r>
-              <a:rPr lang="en-US" dirty="0"/>
-              <a:t>login)</a:t>
-            </a:r>
-          </a:p>
-          <a:p>
-            <a:r>
-              <a:rPr lang="en-US" dirty="0"/>
-              <a:t>4. Add an item (name, price, and picture)</a:t>
-            </a:r>
-          </a:p>
-          <a:p>
-            <a:r>
-              <a:rPr lang="en-US" dirty="0"/>
-              <a:t>5. Update item (price, name or image)</a:t>
-            </a:r>
-          </a:p>
-          <a:p>
-            <a:r>
-              <a:rPr lang="en-US" dirty="0"/>
-              <a:t>6. Delete item</a:t>
-            </a:r>
-          </a:p>
-          <a:p>
-            <a:r>
-              <a:rPr lang="en-US" dirty="0"/>
-              <a:t>7. Update profile (By user or admin)</a:t>
-            </a:r>
-          </a:p>
-          <a:p>
-            <a:r>
-              <a:rPr lang="en-US" dirty="0"/>
-              <a:t>8. Delete profile (By user or admin)</a:t>
-            </a:r>
-          </a:p>
-          <a:p>
-            <a:endParaRPr lang="en-US" dirty="0"/>
+          </a:p>
+          <a:p>
+            <a:endParaRPr lang="en-US"/>
+          </a:p>
+          <a:p>
+            <a:endParaRPr lang="en-US"/>
           </a:p>
         </p:txBody>
       </p:sp>
     </p:spTree>
     <p:extLst>
       <p:ext uri="{BB962C8B-B14F-4D97-AF65-F5344CB8AC3E}">
-        <p14:creationId xmlns:p14="http://schemas.microsoft.com/office/powerpoint/2010/main" val="3003593677"/>
+        <p14:creationId xmlns:p14="http://schemas.microsoft.com/office/powerpoint/2010/main" val="306607062"/>
       </p:ext>
     </p:extLst>
   </p:cSld>
@@ -14646,6 +14602,182 @@
         </p:nvSpPr>
         <p:spPr>
           <a:xfrm>
+            <a:off x="1043490" y="1027664"/>
+            <a:ext cx="7024744" cy="801136"/>
+          </a:xfrm>
+        </p:spPr>
+        <p:txBody>
+          <a:bodyPr/>
+          <a:lstStyle/>
+          <a:p>
+            <a:r>
+              <a:rPr lang="en-US" b="1" dirty="0" smtClean="0"/>
+              <a:t>Summary </a:t>
+            </a:r>
+            <a:r>
+              <a:rPr lang="en-US" b="1" dirty="0"/>
+              <a:t>of </a:t>
+            </a:r>
+            <a:r>
+              <a:rPr lang="en-US" b="1" dirty="0" smtClean="0"/>
+              <a:t>Use </a:t>
+            </a:r>
+            <a:r>
+              <a:rPr lang="en-US" b="1" dirty="0"/>
+              <a:t>C</a:t>
+            </a:r>
+            <a:r>
+              <a:rPr lang="en-US" b="1" dirty="0" smtClean="0"/>
+              <a:t>ases</a:t>
+            </a:r>
+            <a:endParaRPr lang="en-US" b="1" dirty="0"/>
+          </a:p>
+        </p:txBody>
+      </p:sp>
+      <p:sp>
+        <p:nvSpPr>
+          <p:cNvPr id="3" name="Content Placeholder 2"/>
+          <p:cNvSpPr>
+            <a:spLocks noGrp="1"/>
+          </p:cNvSpPr>
+          <p:nvPr>
+            <p:ph idx="1"/>
+          </p:nvPr>
+        </p:nvSpPr>
+        <p:spPr>
+          <a:xfrm>
+            <a:off x="990600" y="1981200"/>
+            <a:ext cx="7543800" cy="4419600"/>
+          </a:xfrm>
+        </p:spPr>
+        <p:txBody>
+          <a:bodyPr>
+            <a:normAutofit/>
+          </a:bodyPr>
+          <a:lstStyle/>
+          <a:p>
+            <a:r>
+              <a:rPr lang="en-US" dirty="0" smtClean="0"/>
+              <a:t>1. Search </a:t>
+            </a:r>
+            <a:r>
+              <a:rPr lang="en-US" dirty="0"/>
+              <a:t>for an item</a:t>
+            </a:r>
+          </a:p>
+          <a:p>
+            <a:r>
+              <a:rPr lang="en-US" dirty="0"/>
+              <a:t>2. Sort Items by distance or price</a:t>
+            </a:r>
+          </a:p>
+          <a:p>
+            <a:r>
+              <a:rPr lang="en-US" dirty="0"/>
+              <a:t>3. Login/ Register (option </a:t>
+            </a:r>
+            <a:r>
+              <a:rPr lang="en-US" dirty="0" smtClean="0"/>
+              <a:t>to</a:t>
+            </a:r>
+            <a:r>
+              <a:rPr lang="en-US" dirty="0"/>
+              <a:t> use </a:t>
+            </a:r>
+            <a:r>
+              <a:rPr lang="en-US" dirty="0" smtClean="0"/>
+              <a:t>Gmail/</a:t>
+            </a:r>
+            <a:r>
+              <a:rPr lang="en-US" dirty="0"/>
+              <a:t>F</a:t>
+            </a:r>
+            <a:r>
+              <a:rPr lang="en-US" dirty="0" smtClean="0"/>
+              <a:t>acebook </a:t>
+            </a:r>
+            <a:r>
+              <a:rPr lang="en-US" dirty="0"/>
+              <a:t>login)</a:t>
+            </a:r>
+          </a:p>
+          <a:p>
+            <a:r>
+              <a:rPr lang="en-US" dirty="0"/>
+              <a:t>4. Add an item (name, price, and picture)</a:t>
+            </a:r>
+          </a:p>
+          <a:p>
+            <a:r>
+              <a:rPr lang="en-US" dirty="0"/>
+              <a:t>5. Update item (price, name or image)</a:t>
+            </a:r>
+          </a:p>
+          <a:p>
+            <a:r>
+              <a:rPr lang="en-US" dirty="0"/>
+              <a:t>6. Delete item</a:t>
+            </a:r>
+          </a:p>
+          <a:p>
+            <a:r>
+              <a:rPr lang="en-US" dirty="0"/>
+              <a:t>7. Update profile (By user or admin)</a:t>
+            </a:r>
+          </a:p>
+          <a:p>
+            <a:r>
+              <a:rPr lang="en-US" dirty="0"/>
+              <a:t>8. Delete profile (By user or admin)</a:t>
+            </a:r>
+          </a:p>
+          <a:p>
+            <a:endParaRPr lang="en-US" dirty="0"/>
+          </a:p>
+        </p:txBody>
+      </p:sp>
+    </p:spTree>
+    <p:extLst>
+      <p:ext uri="{BB962C8B-B14F-4D97-AF65-F5344CB8AC3E}">
+        <p14:creationId xmlns:p14="http://schemas.microsoft.com/office/powerpoint/2010/main" val="3003593677"/>
+      </p:ext>
+    </p:extLst>
+  </p:cSld>
+  <p:clrMapOvr>
+    <a:masterClrMapping/>
+  </p:clrMapOvr>
+</p:sld>
+</file>
+
+<file path=ppt/slides/slide6.xml><?xml version="1.0" encoding="utf-8"?>
+<p:sld xmlns:a="http://schemas.openxmlformats.org/drawingml/2006/main" xmlns:r="http://schemas.openxmlformats.org/officeDocument/2006/relationships" xmlns:p="http://schemas.openxmlformats.org/presentationml/2006/main">
+  <p:cSld>
+    <p:spTree>
+      <p:nvGrpSpPr>
+        <p:cNvPr id="1" name=""/>
+        <p:cNvGrpSpPr/>
+        <p:nvPr/>
+      </p:nvGrpSpPr>
+      <p:grpSpPr>
+        <a:xfrm>
+          <a:off x="0" y="0"/>
+          <a:ext cx="0" cy="0"/>
+          <a:chOff x="0" y="0"/>
+          <a:chExt cx="0" cy="0"/>
+        </a:xfrm>
+      </p:grpSpPr>
+      <p:sp>
+        <p:nvSpPr>
+          <p:cNvPr id="2" name="Title 1"/>
+          <p:cNvSpPr>
+            <a:spLocks noGrp="1"/>
+          </p:cNvSpPr>
+          <p:nvPr>
+            <p:ph type="title"/>
+          </p:nvPr>
+        </p:nvSpPr>
+        <p:spPr>
+          <a:xfrm>
             <a:off x="1043490" y="762000"/>
             <a:ext cx="7024744" cy="762000"/>
           </a:xfrm>
@@ -14698,7 +14830,7 @@
         </p:spPr>
         <p:txBody>
           <a:bodyPr>
-            <a:normAutofit lnSpcReduction="10000"/>
+            <a:normAutofit fontScale="92500" lnSpcReduction="10000"/>
           </a:bodyPr>
           <a:lstStyle/>
           <a:p>

</xml_diff>

<commit_message>
Updated Use cases Diagrams to a Slide
</commit_message>
<xml_diff>
--- a/Deliverbles/Inception/Inception_Stage.pptx
+++ b/Deliverbles/Inception/Inception_Stage.pptx
@@ -10,7 +10,8 @@
     <p:sldId id="261" r:id="rId4"/>
     <p:sldId id="258" r:id="rId5"/>
     <p:sldId id="259" r:id="rId6"/>
-    <p:sldId id="260" r:id="rId7"/>
+    <p:sldId id="262" r:id="rId7"/>
+    <p:sldId id="260" r:id="rId8"/>
   </p:sldIdLst>
   <p:sldSz cx="9144000" cy="6858000" type="screen4x3"/>
   <p:notesSz cx="6858000" cy="9144000"/>
@@ -2869,7 +2870,7 @@
           <a:p>
             <a:fld id="{528CFCD3-A909-4B32-AED5-46A048D390D1}" type="datetimeFigureOut">
               <a:rPr lang="en-US" smtClean="0"/>
-              <a:t>1/28/15</a:t>
+              <a:t>1/29/2015</a:t>
             </a:fld>
             <a:endParaRPr lang="en-US"/>
           </a:p>
@@ -3154,7 +3155,7 @@
           <a:p>
             <a:fld id="{528CFCD3-A909-4B32-AED5-46A048D390D1}" type="datetimeFigureOut">
               <a:rPr lang="en-US" smtClean="0"/>
-              <a:t>1/28/15</a:t>
+              <a:t>1/29/2015</a:t>
             </a:fld>
             <a:endParaRPr lang="en-US"/>
           </a:p>
@@ -3329,7 +3330,7 @@
           <a:p>
             <a:fld id="{528CFCD3-A909-4B32-AED5-46A048D390D1}" type="datetimeFigureOut">
               <a:rPr lang="en-US" smtClean="0"/>
-              <a:t>1/28/15</a:t>
+              <a:t>1/29/2015</a:t>
             </a:fld>
             <a:endParaRPr lang="en-US"/>
           </a:p>
@@ -3494,7 +3495,7 @@
           <a:p>
             <a:fld id="{528CFCD3-A909-4B32-AED5-46A048D390D1}" type="datetimeFigureOut">
               <a:rPr lang="en-US" smtClean="0"/>
-              <a:t>1/28/15</a:t>
+              <a:t>1/29/2015</a:t>
             </a:fld>
             <a:endParaRPr lang="en-US"/>
           </a:p>
@@ -3735,7 +3736,7 @@
           <a:p>
             <a:fld id="{528CFCD3-A909-4B32-AED5-46A048D390D1}" type="datetimeFigureOut">
               <a:rPr lang="en-US" smtClean="0"/>
-              <a:t>1/28/15</a:t>
+              <a:t>1/29/2015</a:t>
             </a:fld>
             <a:endParaRPr lang="en-US"/>
           </a:p>
@@ -3848,7 +3849,7 @@
           <a:p>
             <a:fld id="{528CFCD3-A909-4B32-AED5-46A048D390D1}" type="datetimeFigureOut">
               <a:rPr lang="en-US" smtClean="0"/>
-              <a:t>1/28/15</a:t>
+              <a:t>1/29/2015</a:t>
             </a:fld>
             <a:endParaRPr lang="en-US"/>
           </a:p>
@@ -4387,7 +4388,7 @@
           <a:p>
             <a:fld id="{528CFCD3-A909-4B32-AED5-46A048D390D1}" type="datetimeFigureOut">
               <a:rPr lang="en-US" smtClean="0"/>
-              <a:t>1/28/15</a:t>
+              <a:t>1/29/2015</a:t>
             </a:fld>
             <a:endParaRPr lang="en-US"/>
           </a:p>
@@ -4500,7 +4501,7 @@
           <a:p>
             <a:fld id="{528CFCD3-A909-4B32-AED5-46A048D390D1}" type="datetimeFigureOut">
               <a:rPr lang="en-US" smtClean="0"/>
-              <a:t>1/28/15</a:t>
+              <a:t>1/29/2015</a:t>
             </a:fld>
             <a:endParaRPr lang="en-US"/>
           </a:p>
@@ -4590,7 +4591,7 @@
           <a:p>
             <a:fld id="{528CFCD3-A909-4B32-AED5-46A048D390D1}" type="datetimeFigureOut">
               <a:rPr lang="en-US" smtClean="0"/>
-              <a:t>1/28/15</a:t>
+              <a:t>1/29/2015</a:t>
             </a:fld>
             <a:endParaRPr lang="en-US"/>
           </a:p>
@@ -7241,7 +7242,7 @@
           <a:p>
             <a:fld id="{528CFCD3-A909-4B32-AED5-46A048D390D1}" type="datetimeFigureOut">
               <a:rPr lang="en-US" smtClean="0"/>
-              <a:t>1/28/15</a:t>
+              <a:t>1/29/2015</a:t>
             </a:fld>
             <a:endParaRPr lang="en-US"/>
           </a:p>
@@ -10453,7 +10454,7 @@
           <a:p>
             <a:fld id="{528CFCD3-A909-4B32-AED5-46A048D390D1}" type="datetimeFigureOut">
               <a:rPr lang="en-US" smtClean="0"/>
-              <a:t>1/28/15</a:t>
+              <a:t>1/29/2015</a:t>
             </a:fld>
             <a:endParaRPr lang="en-US"/>
           </a:p>
@@ -13275,7 +13276,7 @@
           <a:p>
             <a:fld id="{528CFCD3-A909-4B32-AED5-46A048D390D1}" type="datetimeFigureOut">
               <a:rPr lang="en-US" smtClean="0"/>
-              <a:t>1/28/15</a:t>
+              <a:t>1/29/2015</a:t>
             </a:fld>
             <a:endParaRPr lang="en-US"/>
           </a:p>
@@ -13925,7 +13926,7 @@
           </a:prstGeom>
           <a:noFill/>
           <a:extLst>
-            <a:ext uri="{909E8E84-426E-40dd-AFC4-6F175D3DCCD1}">
+            <a:ext uri="{909E8E84-426E-40DD-AFC4-6F175D3DCCD1}">
               <a14:hiddenFill xmlns:a14="http://schemas.microsoft.com/office/drawing/2010/main">
                 <a:solidFill>
                   <a:srgbClr val="FFFFFF"/>
@@ -14778,6 +14779,100 @@
         </p:nvSpPr>
         <p:spPr>
           <a:xfrm>
+            <a:off x="1219200" y="533400"/>
+            <a:ext cx="7024744" cy="724936"/>
+          </a:xfrm>
+        </p:spPr>
+        <p:txBody>
+          <a:bodyPr>
+            <a:normAutofit/>
+          </a:bodyPr>
+          <a:lstStyle/>
+          <a:p>
+            <a:pPr algn="ctr"/>
+            <a:r>
+              <a:rPr lang="en-US" b="1" dirty="0" smtClean="0"/>
+              <a:t>Use Case Diagrams</a:t>
+            </a:r>
+            <a:endParaRPr lang="en-US" dirty="0"/>
+          </a:p>
+        </p:txBody>
+      </p:sp>
+      <p:pic>
+        <p:nvPicPr>
+          <p:cNvPr id="4" name="Picture 3" descr="C:\Users\King\Desktop\Spring 2015\CSC440\Inception Phase\UseCaseDiagram.png"/>
+          <p:cNvPicPr/>
+          <p:nvPr/>
+        </p:nvPicPr>
+        <p:blipFill>
+          <a:blip r:embed="rId2">
+            <a:extLst>
+              <a:ext uri="{28A0092B-C50C-407E-A947-70E740481C1C}">
+                <a14:useLocalDpi xmlns:a14="http://schemas.microsoft.com/office/drawing/2010/main" val="0"/>
+              </a:ext>
+            </a:extLst>
+          </a:blip>
+          <a:srcRect/>
+          <a:stretch>
+            <a:fillRect/>
+          </a:stretch>
+        </p:blipFill>
+        <p:spPr bwMode="auto">
+          <a:xfrm>
+            <a:off x="2372995" y="1219200"/>
+            <a:ext cx="4866005" cy="5252085"/>
+          </a:xfrm>
+          <a:prstGeom prst="rect">
+            <a:avLst/>
+          </a:prstGeom>
+          <a:noFill/>
+          <a:ln>
+            <a:noFill/>
+          </a:ln>
+        </p:spPr>
+      </p:pic>
+    </p:spTree>
+    <p:extLst>
+      <p:ext uri="{BB962C8B-B14F-4D97-AF65-F5344CB8AC3E}">
+        <p14:creationId xmlns:p14="http://schemas.microsoft.com/office/powerpoint/2010/main" val="2473698749"/>
+      </p:ext>
+    </p:extLst>
+  </p:cSld>
+  <p:clrMapOvr>
+    <a:masterClrMapping/>
+  </p:clrMapOvr>
+</p:sld>
+</file>
+
+<file path=ppt/slides/slide7.xml><?xml version="1.0" encoding="utf-8"?>
+<p:sld xmlns:a="http://schemas.openxmlformats.org/drawingml/2006/main" xmlns:r="http://schemas.openxmlformats.org/officeDocument/2006/relationships" xmlns:p="http://schemas.openxmlformats.org/presentationml/2006/main">
+  <p:cSld>
+    <p:spTree>
+      <p:nvGrpSpPr>
+        <p:cNvPr id="1" name=""/>
+        <p:cNvGrpSpPr/>
+        <p:nvPr/>
+      </p:nvGrpSpPr>
+      <p:grpSpPr>
+        <a:xfrm>
+          <a:off x="0" y="0"/>
+          <a:ext cx="0" cy="0"/>
+          <a:chOff x="0" y="0"/>
+          <a:chExt cx="0" cy="0"/>
+        </a:xfrm>
+      </p:grpSpPr>
+      <p:sp>
+        <p:nvSpPr>
+          <p:cNvPr id="2" name="Title 1"/>
+          <p:cNvSpPr>
+            <a:spLocks noGrp="1"/>
+          </p:cNvSpPr>
+          <p:nvPr>
+            <p:ph type="title"/>
+          </p:nvPr>
+        </p:nvSpPr>
+        <p:spPr>
+          <a:xfrm>
             <a:off x="1043490" y="762000"/>
             <a:ext cx="7024744" cy="762000"/>
           </a:xfrm>
@@ -14830,7 +14925,7 @@
         </p:spPr>
         <p:txBody>
           <a:bodyPr>
-            <a:normAutofit fontScale="92500" lnSpcReduction="10000"/>
+            <a:normAutofit lnSpcReduction="10000"/>
           </a:bodyPr>
           <a:lstStyle/>
           <a:p>

</xml_diff>

<commit_message>
Updating Inception_Stage.pptx - there were some weird characters on one of the slides
</commit_message>
<xml_diff>
--- a/Deliverbles/Inception/Inception_Stage.pptx
+++ b/Deliverbles/Inception/Inception_Stage.pptx
@@ -110,6 +110,22 @@
       </a:defRPr>
     </a:lvl9pPr>
   </p:defaultTextStyle>
+  <p:extLst>
+    <p:ext uri="{EFAFB233-063F-42B5-8137-9DF3F51BA10A}">
+      <p15:sldGuideLst xmlns:p15="http://schemas.microsoft.com/office/powerpoint/2012/main" xmlns="">
+        <p15:guide id="1" orient="horz" pos="2160">
+          <p15:clr>
+            <a:srgbClr val="A4A3A4"/>
+          </p15:clr>
+        </p15:guide>
+        <p15:guide id="2" pos="2880">
+          <p15:clr>
+            <a:srgbClr val="A4A3A4"/>
+          </p15:clr>
+        </p15:guide>
+      </p15:sldGuideLst>
+    </p:ext>
+  </p:extLst>
 </p:presentation>
 </file>
 
@@ -14930,53 +14946,73 @@
           <a:lstStyle/>
           <a:p>
             <a:r>
+              <a:rPr lang="en-US" dirty="0" smtClean="0"/>
+              <a:t>High </a:t>
+            </a:r>
+            <a:r>
               <a:rPr lang="en-US" dirty="0"/>
-              <a:t>  High Level: Formulate design for UI and database </a:t>
+              <a:t>Level: Formulate design for UI and database </a:t>
             </a:r>
           </a:p>
           <a:p>
             <a:pPr lvl="1"/>
             <a:r>
+              <a:rPr lang="en-US" sz="1800" dirty="0" smtClean="0"/>
+              <a:t>Web  based </a:t>
+            </a:r>
+            <a:r>
               <a:rPr lang="en-US" sz="1800" dirty="0"/>
-              <a:t>  Web based user interface – implementation details?</a:t>
+              <a:t>user interface – implementation details?</a:t>
             </a:r>
           </a:p>
           <a:p>
             <a:pPr lvl="1"/>
             <a:r>
-              <a:rPr lang="en-US" sz="1800" dirty="0"/>
-              <a:t>  </a:t>
+              <a:rPr lang="en-US" sz="1900" dirty="0" smtClean="0"/>
+              <a:t>Database </a:t>
             </a:r>
             <a:r>
               <a:rPr lang="en-US" sz="1900" dirty="0"/>
-              <a:t>Database type and schema design</a:t>
+              <a:t>type and schema design</a:t>
             </a:r>
           </a:p>
           <a:p>
+            <a:r>
+              <a:rPr lang="en-US" dirty="0" smtClean="0"/>
+              <a:t>Detailed </a:t>
+            </a:r>
             <a:r>
               <a:rPr lang="en-US" dirty="0"/>
-              <a:t>  Detailed Level: Draft demo for fully dressed use cases</a:t>
+              <a:t>Level: Draft demo for fully dressed use cases</a:t>
             </a:r>
           </a:p>
           <a:p>
             <a:pPr lvl="1"/>
             <a:r>
+              <a:rPr lang="en-US" sz="1800" dirty="0" smtClean="0"/>
+              <a:t>Search </a:t>
+            </a:r>
+            <a:r>
               <a:rPr lang="en-US" sz="1800" dirty="0"/>
-              <a:t>  Search for grocery item</a:t>
+              <a:t>for grocery item</a:t>
             </a:r>
           </a:p>
           <a:p>
             <a:pPr lvl="1"/>
             <a:r>
+              <a:rPr lang="en-US" sz="1800" dirty="0" smtClean="0"/>
+              <a:t>Add </a:t>
+            </a:r>
+            <a:r>
               <a:rPr lang="en-US" sz="1800" dirty="0"/>
-              <a:t>  Add grocery item </a:t>
+              <a:t>grocery item </a:t>
             </a:r>
           </a:p>
           <a:p>
             <a:pPr lvl="1"/>
             <a:r>
-              <a:rPr lang="en-US" sz="1800" dirty="0"/>
-              <a:t>  Manage </a:t>
+              <a:rPr lang="en-US" sz="1800" dirty="0" smtClean="0"/>
+              <a:t>Manage </a:t>
             </a:r>
             <a:r>
               <a:rPr lang="en-US" sz="1900" dirty="0"/>
@@ -14986,41 +15022,48 @@
               <a:rPr lang="en-US" dirty="0"/>
               <a:t> </a:t>
             </a:r>
-            <a:endParaRPr lang="en-US" dirty="0" smtClean="0"/>
           </a:p>
           <a:p>
             <a:r>
               <a:rPr lang="en-US" dirty="0" smtClean="0"/>
-              <a:t></a:t>
+              <a:t>Issues </a:t>
             </a:r>
             <a:r>
               <a:rPr lang="en-US" dirty="0"/>
-              <a:t>  Issues to complete vs to deferred to the next iteration</a:t>
+              <a:t>to complete vs to deferred to the next iteration</a:t>
             </a:r>
           </a:p>
           <a:p>
             <a:pPr lvl="1"/>
             <a:r>
+              <a:rPr lang="en-US" sz="1800" dirty="0" smtClean="0"/>
+              <a:t>Searching </a:t>
+            </a:r>
+            <a:r>
               <a:rPr lang="en-US" sz="1800" dirty="0"/>
-              <a:t>  Searching with predictive text?</a:t>
+              <a:t>with predictive text?</a:t>
             </a:r>
           </a:p>
           <a:p>
             <a:pPr lvl="1"/>
             <a:r>
+              <a:rPr lang="en-US" sz="1800" dirty="0" smtClean="0"/>
+              <a:t>Will </a:t>
+            </a:r>
+            <a:r>
               <a:rPr lang="en-US" sz="1800" dirty="0"/>
-              <a:t>  Will we need to create authentication piece for the ‘add grocery item’ use case?</a:t>
+              <a:t>we need to create authentication piece for the ‘add grocery item’ use case?</a:t>
             </a:r>
           </a:p>
           <a:p>
             <a:pPr lvl="1"/>
             <a:r>
-              <a:rPr lang="en-US" sz="1800" dirty="0"/>
-              <a:t>  </a:t>
+              <a:rPr lang="en-US" sz="1900" smtClean="0"/>
+              <a:t>Do </a:t>
             </a:r>
             <a:r>
               <a:rPr lang="en-US" sz="1900" dirty="0"/>
-              <a:t>Do we start with anything populated in our database? </a:t>
+              <a:t>we start with anything populated in our database? </a:t>
             </a:r>
           </a:p>
         </p:txBody>

</xml_diff>

<commit_message>
Update project and Goal Slide
</commit_message>
<xml_diff>
--- a/Deliverbles/Inception/Inception_Stage.pptx
+++ b/Deliverbles/Inception/Inception_Stage.pptx
@@ -7,11 +7,10 @@
   <p:sldIdLst>
     <p:sldId id="256" r:id="rId2"/>
     <p:sldId id="257" r:id="rId3"/>
-    <p:sldId id="261" r:id="rId4"/>
-    <p:sldId id="258" r:id="rId5"/>
-    <p:sldId id="259" r:id="rId6"/>
-    <p:sldId id="262" r:id="rId7"/>
-    <p:sldId id="260" r:id="rId8"/>
+    <p:sldId id="258" r:id="rId4"/>
+    <p:sldId id="259" r:id="rId5"/>
+    <p:sldId id="262" r:id="rId6"/>
+    <p:sldId id="260" r:id="rId7"/>
   </p:sldIdLst>
   <p:sldSz cx="9144000" cy="6858000" type="screen4x3"/>
   <p:notesSz cx="6858000" cy="9144000"/>
@@ -112,7 +111,7 @@
   </p:defaultTextStyle>
   <p:extLst>
     <p:ext uri="{EFAFB233-063F-42B5-8137-9DF3F51BA10A}">
-      <p15:sldGuideLst xmlns:p15="http://schemas.microsoft.com/office/powerpoint/2012/main" xmlns="">
+      <p15:sldGuideLst xmlns="" xmlns:p15="http://schemas.microsoft.com/office/powerpoint/2012/main">
         <p15:guide id="1" orient="horz" pos="2160">
           <p15:clr>
             <a:srgbClr val="A4A3A4"/>
@@ -14322,7 +14321,12 @@
             <p:ph type="title"/>
           </p:nvPr>
         </p:nvSpPr>
-        <p:spPr/>
+        <p:spPr>
+          <a:xfrm>
+            <a:off x="1043490" y="304800"/>
+            <a:ext cx="7024744" cy="1143000"/>
+          </a:xfrm>
+        </p:spPr>
         <p:txBody>
           <a:bodyPr/>
           <a:lstStyle/>
@@ -14353,7 +14357,12 @@
             <p:ph idx="1"/>
           </p:nvPr>
         </p:nvSpPr>
-        <p:spPr/>
+        <p:spPr>
+          <a:xfrm>
+            <a:off x="1043492" y="1520223"/>
+            <a:ext cx="7262308" cy="4194777"/>
+          </a:xfrm>
+        </p:spPr>
         <p:txBody>
           <a:bodyPr>
             <a:normAutofit fontScale="92500"/>
@@ -14361,12 +14370,66 @@
           <a:lstStyle/>
           <a:p>
             <a:r>
-              <a:rPr lang="en-US"/>
-              <a:t>Grocery pricing currently varies wildly based on variables such as supply, demand, and the availability of substitute items. We envision a web application that will allow an end user to compare the price of a grocery item based on geographic location. Other features include the ability to crowdsource grocery prices, and add and remove grocery items from a geographic region based on availability.</a:t>
+              <a:rPr lang="en-US" sz="2600" dirty="0" smtClean="0"/>
+              <a:t>Users are able to compare/check price of any items within their Area.</a:t>
             </a:r>
           </a:p>
           <a:p>
-            <a:endParaRPr lang="en-US"/>
+            <a:r>
+              <a:rPr lang="en-US" sz="2600" dirty="0" smtClean="0"/>
+              <a:t>Users are able to login with their Gmail/Facebook account</a:t>
+            </a:r>
+          </a:p>
+          <a:p>
+            <a:pPr lvl="1"/>
+            <a:r>
+              <a:rPr lang="en-US" dirty="0" smtClean="0"/>
+              <a:t>Users have option to register with a new login</a:t>
+            </a:r>
+          </a:p>
+          <a:p>
+            <a:r>
+              <a:rPr lang="en-US" sz="2600" dirty="0"/>
+              <a:t>Users are able </a:t>
+            </a:r>
+            <a:r>
+              <a:rPr lang="en-US" sz="2600" dirty="0" smtClean="0"/>
+              <a:t>to update price on any items </a:t>
+            </a:r>
+            <a:r>
+              <a:rPr lang="en-US" sz="2600" dirty="0"/>
+              <a:t>within their Area</a:t>
+            </a:r>
+            <a:r>
+              <a:rPr lang="en-US" sz="2600" dirty="0" smtClean="0"/>
+              <a:t>.</a:t>
+            </a:r>
+          </a:p>
+          <a:p>
+            <a:r>
+              <a:rPr lang="en-US" sz="2600" dirty="0" smtClean="0"/>
+              <a:t>Users are able to add/delete any items within their Area.</a:t>
+            </a:r>
+          </a:p>
+          <a:p>
+            <a:r>
+              <a:rPr lang="en-US" sz="2600" dirty="0"/>
+              <a:t>Users are able to </a:t>
+            </a:r>
+            <a:r>
+              <a:rPr lang="en-US" sz="2600" dirty="0" smtClean="0"/>
+              <a:t>update/Delete their profile</a:t>
+            </a:r>
+            <a:endParaRPr lang="en-US" sz="2600" dirty="0"/>
+          </a:p>
+          <a:p>
+            <a:endParaRPr lang="en-US" dirty="0" smtClean="0"/>
+          </a:p>
+          <a:p>
+            <a:endParaRPr lang="en-US" dirty="0" smtClean="0"/>
+          </a:p>
+          <a:p>
+            <a:endParaRPr lang="en-US" dirty="0"/>
           </a:p>
         </p:txBody>
       </p:sp>
@@ -14410,22 +14473,31 @@
             <p:ph type="title"/>
           </p:nvPr>
         </p:nvSpPr>
-        <p:spPr/>
+        <p:spPr>
+          <a:xfrm>
+            <a:off x="990600" y="1066800"/>
+            <a:ext cx="7024744" cy="1143000"/>
+          </a:xfrm>
+        </p:spPr>
         <p:txBody>
           <a:bodyPr/>
           <a:lstStyle/>
           <a:p>
             <a:r>
+              <a:rPr lang="en-US" b="1" dirty="0"/>
+              <a:t>R</a:t>
+            </a:r>
+            <a:r>
               <a:rPr lang="en-US" b="1" dirty="0" smtClean="0"/>
-              <a:t>Project Aim </a:t>
+              <a:t>equirement </a:t>
             </a:r>
             <a:r>
               <a:rPr lang="en-US" b="1" dirty="0"/>
-              <a:t>and </a:t>
+              <a:t>A</a:t>
             </a:r>
             <a:r>
               <a:rPr lang="en-US" b="1" dirty="0" smtClean="0"/>
-              <a:t>Goal</a:t>
+              <a:t>nalysis</a:t>
             </a:r>
             <a:endParaRPr lang="en-US" b="1" dirty="0"/>
           </a:p>
@@ -14443,28 +14515,44 @@
         </p:nvSpPr>
         <p:spPr/>
         <p:txBody>
-          <a:bodyPr>
-            <a:normAutofit/>
-          </a:bodyPr>
+          <a:bodyPr/>
           <a:lstStyle/>
           <a:p>
             <a:r>
-              <a:rPr lang="en-US"/>
-              <a:t>There is currently no way for a grocery consumer to compare prices within a geographic region. This application will fill that void with a reliable geographically-based comparison engine and crowdsourcing features.</a:t>
+              <a:rPr lang="en-US" dirty="0"/>
+              <a:t>Grocery items categorized by geographical area</a:t>
             </a:r>
           </a:p>
           <a:p>
-            <a:pPr marL="68580" indent="0">
-              <a:buNone/>
-            </a:pPr>
-            <a:endParaRPr lang="en-US"/>
+            <a:r>
+              <a:rPr lang="en-US" dirty="0"/>
+              <a:t>Ability for users to add/remove/modify grocery items within geographical area</a:t>
+            </a:r>
+          </a:p>
+          <a:p>
+            <a:r>
+              <a:rPr lang="en-US" dirty="0"/>
+              <a:t>Ability for users to easily query grocery item data</a:t>
+            </a:r>
+          </a:p>
+          <a:p>
+            <a:r>
+              <a:rPr lang="en-US" dirty="0"/>
+              <a:t>Account system and administration system for community management</a:t>
+            </a:r>
+          </a:p>
+          <a:p>
+            <a:endParaRPr lang="en-US" dirty="0"/>
+          </a:p>
+          <a:p>
+            <a:endParaRPr lang="en-US" dirty="0"/>
           </a:p>
         </p:txBody>
       </p:sp>
     </p:spTree>
     <p:extLst>
       <p:ext uri="{BB962C8B-B14F-4D97-AF65-F5344CB8AC3E}">
-        <p14:creationId xmlns:p14="http://schemas.microsoft.com/office/powerpoint/2010/main" val="2371507751"/>
+        <p14:creationId xmlns:p14="http://schemas.microsoft.com/office/powerpoint/2010/main" val="306607062"/>
       </p:ext>
     </p:extLst>
   </p:cSld>
@@ -14503,122 +14591,6 @@
         </p:nvSpPr>
         <p:spPr>
           <a:xfrm>
-            <a:off x="990600" y="1066800"/>
-            <a:ext cx="7024744" cy="1143000"/>
-          </a:xfrm>
-        </p:spPr>
-        <p:txBody>
-          <a:bodyPr/>
-          <a:lstStyle/>
-          <a:p>
-            <a:r>
-              <a:rPr lang="en-US" b="1" dirty="0"/>
-              <a:t>R</a:t>
-            </a:r>
-            <a:r>
-              <a:rPr lang="en-US" b="1" dirty="0" smtClean="0"/>
-              <a:t>equirement </a:t>
-            </a:r>
-            <a:r>
-              <a:rPr lang="en-US" b="1" dirty="0"/>
-              <a:t>A</a:t>
-            </a:r>
-            <a:r>
-              <a:rPr lang="en-US" b="1" dirty="0" smtClean="0"/>
-              <a:t>nalysis</a:t>
-            </a:r>
-            <a:endParaRPr lang="en-US" b="1" dirty="0"/>
-          </a:p>
-        </p:txBody>
-      </p:sp>
-      <p:sp>
-        <p:nvSpPr>
-          <p:cNvPr id="3" name="Content Placeholder 2"/>
-          <p:cNvSpPr>
-            <a:spLocks noGrp="1"/>
-          </p:cNvSpPr>
-          <p:nvPr>
-            <p:ph idx="1"/>
-          </p:nvPr>
-        </p:nvSpPr>
-        <p:spPr/>
-        <p:txBody>
-          <a:bodyPr/>
-          <a:lstStyle/>
-          <a:p>
-            <a:r>
-              <a:rPr lang="en-US"/>
-              <a:t>Grocery items categorized by geographical area</a:t>
-            </a:r>
-          </a:p>
-          <a:p>
-            <a:r>
-              <a:rPr lang="en-US"/>
-              <a:t>Ability for users to add/remove/modify grocery items within geographical area</a:t>
-            </a:r>
-          </a:p>
-          <a:p>
-            <a:r>
-              <a:rPr lang="en-US"/>
-              <a:t>Ability for users to easily query grocery item data</a:t>
-            </a:r>
-          </a:p>
-          <a:p>
-            <a:r>
-              <a:rPr lang="en-US"/>
-              <a:t>Account system and administration system for community management</a:t>
-            </a:r>
-          </a:p>
-          <a:p>
-            <a:endParaRPr lang="en-US"/>
-          </a:p>
-          <a:p>
-            <a:endParaRPr lang="en-US"/>
-          </a:p>
-        </p:txBody>
-      </p:sp>
-    </p:spTree>
-    <p:extLst>
-      <p:ext uri="{BB962C8B-B14F-4D97-AF65-F5344CB8AC3E}">
-        <p14:creationId xmlns:p14="http://schemas.microsoft.com/office/powerpoint/2010/main" val="306607062"/>
-      </p:ext>
-    </p:extLst>
-  </p:cSld>
-  <p:clrMapOvr>
-    <a:masterClrMapping/>
-  </p:clrMapOvr>
-</p:sld>
-</file>
-
-<file path=ppt/slides/slide5.xml><?xml version="1.0" encoding="utf-8"?>
-<p:sld xmlns:a="http://schemas.openxmlformats.org/drawingml/2006/main" xmlns:r="http://schemas.openxmlformats.org/officeDocument/2006/relationships" xmlns:p="http://schemas.openxmlformats.org/presentationml/2006/main">
-  <p:cSld>
-    <p:spTree>
-      <p:nvGrpSpPr>
-        <p:cNvPr id="1" name=""/>
-        <p:cNvGrpSpPr/>
-        <p:nvPr/>
-      </p:nvGrpSpPr>
-      <p:grpSpPr>
-        <a:xfrm>
-          <a:off x="0" y="0"/>
-          <a:ext cx="0" cy="0"/>
-          <a:chOff x="0" y="0"/>
-          <a:chExt cx="0" cy="0"/>
-        </a:xfrm>
-      </p:grpSpPr>
-      <p:sp>
-        <p:nvSpPr>
-          <p:cNvPr id="2" name="Title 1"/>
-          <p:cNvSpPr>
-            <a:spLocks noGrp="1"/>
-          </p:cNvSpPr>
-          <p:nvPr>
-            <p:ph type="title"/>
-          </p:nvPr>
-        </p:nvSpPr>
-        <p:spPr>
-          <a:xfrm>
             <a:off x="1043490" y="1027664"/>
             <a:ext cx="7024744" cy="801136"/>
           </a:xfrm>
@@ -14766,7 +14738,7 @@
 </p:sld>
 </file>
 
-<file path=ppt/slides/slide6.xml><?xml version="1.0" encoding="utf-8"?>
+<file path=ppt/slides/slide5.xml><?xml version="1.0" encoding="utf-8"?>
 <p:sld xmlns:a="http://schemas.openxmlformats.org/drawingml/2006/main" xmlns:r="http://schemas.openxmlformats.org/officeDocument/2006/relationships" xmlns:p="http://schemas.openxmlformats.org/presentationml/2006/main">
   <p:cSld>
     <p:spTree>
@@ -14860,7 +14832,7 @@
 </p:sld>
 </file>
 
-<file path=ppt/slides/slide7.xml><?xml version="1.0" encoding="utf-8"?>
+<file path=ppt/slides/slide6.xml><?xml version="1.0" encoding="utf-8"?>
 <p:sld xmlns:a="http://schemas.openxmlformats.org/drawingml/2006/main" xmlns:r="http://schemas.openxmlformats.org/officeDocument/2006/relationships" xmlns:p="http://schemas.openxmlformats.org/presentationml/2006/main">
   <p:cSld>
     <p:spTree>

</xml_diff>